<commit_message>
Update Challenge Platinum_ Membuat API untuk Analisis Sentimen dan Laporan Analisis Data berdasarkan Sentimen.pptx
Tambahan Hasil
</commit_message>
<xml_diff>
--- a/Challenge Platinum_ Membuat API untuk Analisis Sentimen dan Laporan Analisis Data berdasarkan Sentimen.pptx
+++ b/Challenge Platinum_ Membuat API untuk Analisis Sentimen dan Laporan Analisis Data berdasarkan Sentimen.pptx
@@ -10,16 +10,22 @@
   <p:sldIdLst>
     <p:sldId id="256" r:id="rId6"/>
     <p:sldId id="257" r:id="rId7"/>
+    <p:sldId id="258" r:id="rId8"/>
+    <p:sldId id="259" r:id="rId9"/>
+    <p:sldId id="260" r:id="rId10"/>
+    <p:sldId id="261" r:id="rId11"/>
+    <p:sldId id="262" r:id="rId12"/>
+    <p:sldId id="263" r:id="rId13"/>
   </p:sldIdLst>
   <p:sldSz cy="5143500" cx="9144000"/>
   <p:notesSz cx="6858000" cy="9144000"/>
   <p:embeddedFontLst>
     <p:embeddedFont>
       <p:font typeface="Nunito"/>
-      <p:regular r:id="rId8"/>
-      <p:bold r:id="rId9"/>
-      <p:italic r:id="rId10"/>
-      <p:boldItalic r:id="rId11"/>
+      <p:regular r:id="rId14"/>
+      <p:bold r:id="rId15"/>
+      <p:italic r:id="rId16"/>
+      <p:boldItalic r:id="rId17"/>
     </p:embeddedFont>
   </p:embeddedFontLst>
   <p:defaultTextStyle>
@@ -850,6 +856,600 @@
       <p:sp>
         <p:nvSpPr>
           <p:cNvPr id="132" name="Google Shape;132;g23168ecdf95_0_119:notes"/>
+          <p:cNvSpPr txBox="1"/>
+          <p:nvPr>
+            <p:ph idx="1" type="body"/>
+          </p:nvPr>
+        </p:nvSpPr>
+        <p:spPr>
+          <a:xfrm>
+            <a:off x="685800" y="4343400"/>
+            <a:ext cx="5486400" cy="4114800"/>
+          </a:xfrm>
+          <a:prstGeom prst="rect">
+            <a:avLst/>
+          </a:prstGeom>
+        </p:spPr>
+        <p:txBody>
+          <a:bodyPr anchorCtr="0" anchor="t" bIns="91425" lIns="91425" spcFirstLastPara="1" rIns="91425" wrap="square" tIns="91425">
+            <a:noAutofit/>
+          </a:bodyPr>
+          <a:lstStyle/>
+          <a:p>
+            <a:pPr indent="0" lvl="0" marL="0" rtl="0" algn="l">
+              <a:spcBef>
+                <a:spcPts val="0"/>
+              </a:spcBef>
+              <a:spcAft>
+                <a:spcPts val="0"/>
+              </a:spcAft>
+              <a:buNone/>
+            </a:pPr>
+            <a:r>
+              <a:t/>
+            </a:r>
+            <a:endParaRPr/>
+          </a:p>
+        </p:txBody>
+      </p:sp>
+    </p:spTree>
+  </p:cSld>
+  <p:clrMapOvr>
+    <a:masterClrMapping/>
+  </p:clrMapOvr>
+</p:notes>
+</file>
+
+<file path=ppt/notesSlides/notesSlide3.xml><?xml version="1.0" encoding="utf-8"?>
+<p:notes xmlns:a="http://schemas.openxmlformats.org/drawingml/2006/main" xmlns:r="http://schemas.openxmlformats.org/officeDocument/2006/relationships" xmlns:mc="http://schemas.openxmlformats.org/markup-compatibility/2006" xmlns:mv="urn:schemas-microsoft-com:mac:vml" xmlns:p="http://schemas.openxmlformats.org/presentationml/2006/main" xmlns:c="http://schemas.openxmlformats.org/drawingml/2006/chart" xmlns:dgm="http://schemas.openxmlformats.org/drawingml/2006/diagram" xmlns:o="urn:schemas-microsoft-com:office:office" xmlns:v="urn:schemas-microsoft-com:vml" xmlns:pvml="urn:schemas-microsoft-com:office:powerpoint" xmlns:com="http://schemas.openxmlformats.org/drawingml/2006/compatibility" xmlns:p14="http://schemas.microsoft.com/office/powerpoint/2010/main" xmlns:p15="http://schemas.microsoft.com/office/powerpoint/2012/main" xmlns:ahyp="http://schemas.microsoft.com/office/drawing/2018/hyperlinkcolor" showMasterPhAnim="0" showMasterSp="0">
+  <p:cSld>
+    <p:spTree>
+      <p:nvGrpSpPr>
+        <p:cNvPr id="136" name="Shape 136"/>
+        <p:cNvGrpSpPr/>
+        <p:nvPr/>
+      </p:nvGrpSpPr>
+      <p:grpSpPr>
+        <a:xfrm>
+          <a:off x="0" y="0"/>
+          <a:ext cx="0" cy="0"/>
+          <a:chOff x="0" y="0"/>
+          <a:chExt cx="0" cy="0"/>
+        </a:xfrm>
+      </p:grpSpPr>
+      <p:sp>
+        <p:nvSpPr>
+          <p:cNvPr id="137" name="Google Shape;137;g23168ecdf95_0_125:notes"/>
+          <p:cNvSpPr/>
+          <p:nvPr>
+            <p:ph idx="2" type="sldImg"/>
+          </p:nvPr>
+        </p:nvSpPr>
+        <p:spPr>
+          <a:xfrm>
+            <a:off x="381300" y="685800"/>
+            <a:ext cx="6096000" cy="3429000"/>
+          </a:xfrm>
+          <a:custGeom>
+            <a:rect b="b" l="l" r="r" t="t"/>
+            <a:pathLst>
+              <a:path extrusionOk="0" h="120000" w="120000">
+                <a:moveTo>
+                  <a:pt x="0" y="0"/>
+                </a:moveTo>
+                <a:lnTo>
+                  <a:pt x="120000" y="0"/>
+                </a:lnTo>
+                <a:lnTo>
+                  <a:pt x="120000" y="120000"/>
+                </a:lnTo>
+                <a:lnTo>
+                  <a:pt x="0" y="120000"/>
+                </a:lnTo>
+                <a:close/>
+              </a:path>
+            </a:pathLst>
+          </a:custGeom>
+        </p:spPr>
+      </p:sp>
+      <p:sp>
+        <p:nvSpPr>
+          <p:cNvPr id="138" name="Google Shape;138;g23168ecdf95_0_125:notes"/>
+          <p:cNvSpPr txBox="1"/>
+          <p:nvPr>
+            <p:ph idx="1" type="body"/>
+          </p:nvPr>
+        </p:nvSpPr>
+        <p:spPr>
+          <a:xfrm>
+            <a:off x="685800" y="4343400"/>
+            <a:ext cx="5486400" cy="4114800"/>
+          </a:xfrm>
+          <a:prstGeom prst="rect">
+            <a:avLst/>
+          </a:prstGeom>
+        </p:spPr>
+        <p:txBody>
+          <a:bodyPr anchorCtr="0" anchor="t" bIns="91425" lIns="91425" spcFirstLastPara="1" rIns="91425" wrap="square" tIns="91425">
+            <a:noAutofit/>
+          </a:bodyPr>
+          <a:lstStyle/>
+          <a:p>
+            <a:pPr indent="0" lvl="0" marL="0" rtl="0" algn="l">
+              <a:spcBef>
+                <a:spcPts val="0"/>
+              </a:spcBef>
+              <a:spcAft>
+                <a:spcPts val="0"/>
+              </a:spcAft>
+              <a:buNone/>
+            </a:pPr>
+            <a:r>
+              <a:t/>
+            </a:r>
+            <a:endParaRPr/>
+          </a:p>
+        </p:txBody>
+      </p:sp>
+    </p:spTree>
+  </p:cSld>
+  <p:clrMapOvr>
+    <a:masterClrMapping/>
+  </p:clrMapOvr>
+</p:notes>
+</file>
+
+<file path=ppt/notesSlides/notesSlide4.xml><?xml version="1.0" encoding="utf-8"?>
+<p:notes xmlns:a="http://schemas.openxmlformats.org/drawingml/2006/main" xmlns:r="http://schemas.openxmlformats.org/officeDocument/2006/relationships" xmlns:mc="http://schemas.openxmlformats.org/markup-compatibility/2006" xmlns:mv="urn:schemas-microsoft-com:mac:vml" xmlns:p="http://schemas.openxmlformats.org/presentationml/2006/main" xmlns:c="http://schemas.openxmlformats.org/drawingml/2006/chart" xmlns:dgm="http://schemas.openxmlformats.org/drawingml/2006/diagram" xmlns:o="urn:schemas-microsoft-com:office:office" xmlns:v="urn:schemas-microsoft-com:vml" xmlns:pvml="urn:schemas-microsoft-com:office:powerpoint" xmlns:com="http://schemas.openxmlformats.org/drawingml/2006/compatibility" xmlns:p14="http://schemas.microsoft.com/office/powerpoint/2010/main" xmlns:p15="http://schemas.microsoft.com/office/powerpoint/2012/main" xmlns:ahyp="http://schemas.microsoft.com/office/drawing/2018/hyperlinkcolor" showMasterPhAnim="0" showMasterSp="0">
+  <p:cSld>
+    <p:spTree>
+      <p:nvGrpSpPr>
+        <p:cNvPr id="143" name="Shape 143"/>
+        <p:cNvGrpSpPr/>
+        <p:nvPr/>
+      </p:nvGrpSpPr>
+      <p:grpSpPr>
+        <a:xfrm>
+          <a:off x="0" y="0"/>
+          <a:ext cx="0" cy="0"/>
+          <a:chOff x="0" y="0"/>
+          <a:chExt cx="0" cy="0"/>
+        </a:xfrm>
+      </p:grpSpPr>
+      <p:sp>
+        <p:nvSpPr>
+          <p:cNvPr id="144" name="Google Shape;144;g23168ecdf95_0_132:notes"/>
+          <p:cNvSpPr/>
+          <p:nvPr>
+            <p:ph idx="2" type="sldImg"/>
+          </p:nvPr>
+        </p:nvSpPr>
+        <p:spPr>
+          <a:xfrm>
+            <a:off x="381300" y="685800"/>
+            <a:ext cx="6096000" cy="3429000"/>
+          </a:xfrm>
+          <a:custGeom>
+            <a:rect b="b" l="l" r="r" t="t"/>
+            <a:pathLst>
+              <a:path extrusionOk="0" h="120000" w="120000">
+                <a:moveTo>
+                  <a:pt x="0" y="0"/>
+                </a:moveTo>
+                <a:lnTo>
+                  <a:pt x="120000" y="0"/>
+                </a:lnTo>
+                <a:lnTo>
+                  <a:pt x="120000" y="120000"/>
+                </a:lnTo>
+                <a:lnTo>
+                  <a:pt x="0" y="120000"/>
+                </a:lnTo>
+                <a:close/>
+              </a:path>
+            </a:pathLst>
+          </a:custGeom>
+        </p:spPr>
+      </p:sp>
+      <p:sp>
+        <p:nvSpPr>
+          <p:cNvPr id="145" name="Google Shape;145;g23168ecdf95_0_132:notes"/>
+          <p:cNvSpPr txBox="1"/>
+          <p:nvPr>
+            <p:ph idx="1" type="body"/>
+          </p:nvPr>
+        </p:nvSpPr>
+        <p:spPr>
+          <a:xfrm>
+            <a:off x="685800" y="4343400"/>
+            <a:ext cx="5486400" cy="4114800"/>
+          </a:xfrm>
+          <a:prstGeom prst="rect">
+            <a:avLst/>
+          </a:prstGeom>
+        </p:spPr>
+        <p:txBody>
+          <a:bodyPr anchorCtr="0" anchor="t" bIns="91425" lIns="91425" spcFirstLastPara="1" rIns="91425" wrap="square" tIns="91425">
+            <a:noAutofit/>
+          </a:bodyPr>
+          <a:lstStyle/>
+          <a:p>
+            <a:pPr indent="0" lvl="0" marL="0" rtl="0" algn="l">
+              <a:spcBef>
+                <a:spcPts val="0"/>
+              </a:spcBef>
+              <a:spcAft>
+                <a:spcPts val="0"/>
+              </a:spcAft>
+              <a:buNone/>
+            </a:pPr>
+            <a:r>
+              <a:t/>
+            </a:r>
+            <a:endParaRPr/>
+          </a:p>
+        </p:txBody>
+      </p:sp>
+    </p:spTree>
+  </p:cSld>
+  <p:clrMapOvr>
+    <a:masterClrMapping/>
+  </p:clrMapOvr>
+</p:notes>
+</file>
+
+<file path=ppt/notesSlides/notesSlide5.xml><?xml version="1.0" encoding="utf-8"?>
+<p:notes xmlns:a="http://schemas.openxmlformats.org/drawingml/2006/main" xmlns:r="http://schemas.openxmlformats.org/officeDocument/2006/relationships" xmlns:mc="http://schemas.openxmlformats.org/markup-compatibility/2006" xmlns:mv="urn:schemas-microsoft-com:mac:vml" xmlns:p="http://schemas.openxmlformats.org/presentationml/2006/main" xmlns:c="http://schemas.openxmlformats.org/drawingml/2006/chart" xmlns:dgm="http://schemas.openxmlformats.org/drawingml/2006/diagram" xmlns:o="urn:schemas-microsoft-com:office:office" xmlns:v="urn:schemas-microsoft-com:vml" xmlns:pvml="urn:schemas-microsoft-com:office:powerpoint" xmlns:com="http://schemas.openxmlformats.org/drawingml/2006/compatibility" xmlns:p14="http://schemas.microsoft.com/office/powerpoint/2010/main" xmlns:p15="http://schemas.microsoft.com/office/powerpoint/2012/main" xmlns:ahyp="http://schemas.microsoft.com/office/drawing/2018/hyperlinkcolor" showMasterPhAnim="0" showMasterSp="0">
+  <p:cSld>
+    <p:spTree>
+      <p:nvGrpSpPr>
+        <p:cNvPr id="149" name="Shape 149"/>
+        <p:cNvGrpSpPr/>
+        <p:nvPr/>
+      </p:nvGrpSpPr>
+      <p:grpSpPr>
+        <a:xfrm>
+          <a:off x="0" y="0"/>
+          <a:ext cx="0" cy="0"/>
+          <a:chOff x="0" y="0"/>
+          <a:chExt cx="0" cy="0"/>
+        </a:xfrm>
+      </p:grpSpPr>
+      <p:sp>
+        <p:nvSpPr>
+          <p:cNvPr id="150" name="Google Shape;150;g23168ecdf95_0_141:notes"/>
+          <p:cNvSpPr/>
+          <p:nvPr>
+            <p:ph idx="2" type="sldImg"/>
+          </p:nvPr>
+        </p:nvSpPr>
+        <p:spPr>
+          <a:xfrm>
+            <a:off x="381300" y="685800"/>
+            <a:ext cx="6096000" cy="3429000"/>
+          </a:xfrm>
+          <a:custGeom>
+            <a:rect b="b" l="l" r="r" t="t"/>
+            <a:pathLst>
+              <a:path extrusionOk="0" h="120000" w="120000">
+                <a:moveTo>
+                  <a:pt x="0" y="0"/>
+                </a:moveTo>
+                <a:lnTo>
+                  <a:pt x="120000" y="0"/>
+                </a:lnTo>
+                <a:lnTo>
+                  <a:pt x="120000" y="120000"/>
+                </a:lnTo>
+                <a:lnTo>
+                  <a:pt x="0" y="120000"/>
+                </a:lnTo>
+                <a:close/>
+              </a:path>
+            </a:pathLst>
+          </a:custGeom>
+        </p:spPr>
+      </p:sp>
+      <p:sp>
+        <p:nvSpPr>
+          <p:cNvPr id="151" name="Google Shape;151;g23168ecdf95_0_141:notes"/>
+          <p:cNvSpPr txBox="1"/>
+          <p:nvPr>
+            <p:ph idx="1" type="body"/>
+          </p:nvPr>
+        </p:nvSpPr>
+        <p:spPr>
+          <a:xfrm>
+            <a:off x="685800" y="4343400"/>
+            <a:ext cx="5486400" cy="4114800"/>
+          </a:xfrm>
+          <a:prstGeom prst="rect">
+            <a:avLst/>
+          </a:prstGeom>
+        </p:spPr>
+        <p:txBody>
+          <a:bodyPr anchorCtr="0" anchor="t" bIns="91425" lIns="91425" spcFirstLastPara="1" rIns="91425" wrap="square" tIns="91425">
+            <a:noAutofit/>
+          </a:bodyPr>
+          <a:lstStyle/>
+          <a:p>
+            <a:pPr indent="0" lvl="0" marL="0" rtl="0" algn="l">
+              <a:spcBef>
+                <a:spcPts val="0"/>
+              </a:spcBef>
+              <a:spcAft>
+                <a:spcPts val="0"/>
+              </a:spcAft>
+              <a:buNone/>
+            </a:pPr>
+            <a:r>
+              <a:t/>
+            </a:r>
+            <a:endParaRPr/>
+          </a:p>
+        </p:txBody>
+      </p:sp>
+    </p:spTree>
+  </p:cSld>
+  <p:clrMapOvr>
+    <a:masterClrMapping/>
+  </p:clrMapOvr>
+</p:notes>
+</file>
+
+<file path=ppt/notesSlides/notesSlide6.xml><?xml version="1.0" encoding="utf-8"?>
+<p:notes xmlns:a="http://schemas.openxmlformats.org/drawingml/2006/main" xmlns:r="http://schemas.openxmlformats.org/officeDocument/2006/relationships" xmlns:mc="http://schemas.openxmlformats.org/markup-compatibility/2006" xmlns:mv="urn:schemas-microsoft-com:mac:vml" xmlns:p="http://schemas.openxmlformats.org/presentationml/2006/main" xmlns:c="http://schemas.openxmlformats.org/drawingml/2006/chart" xmlns:dgm="http://schemas.openxmlformats.org/drawingml/2006/diagram" xmlns:o="urn:schemas-microsoft-com:office:office" xmlns:v="urn:schemas-microsoft-com:vml" xmlns:pvml="urn:schemas-microsoft-com:office:powerpoint" xmlns:com="http://schemas.openxmlformats.org/drawingml/2006/compatibility" xmlns:p14="http://schemas.microsoft.com/office/powerpoint/2010/main" xmlns:p15="http://schemas.microsoft.com/office/powerpoint/2012/main" xmlns:ahyp="http://schemas.microsoft.com/office/drawing/2018/hyperlinkcolor" showMasterPhAnim="0" showMasterSp="0">
+  <p:cSld>
+    <p:spTree>
+      <p:nvGrpSpPr>
+        <p:cNvPr id="155" name="Shape 155"/>
+        <p:cNvGrpSpPr/>
+        <p:nvPr/>
+      </p:nvGrpSpPr>
+      <p:grpSpPr>
+        <a:xfrm>
+          <a:off x="0" y="0"/>
+          <a:ext cx="0" cy="0"/>
+          <a:chOff x="0" y="0"/>
+          <a:chExt cx="0" cy="0"/>
+        </a:xfrm>
+      </p:grpSpPr>
+      <p:sp>
+        <p:nvSpPr>
+          <p:cNvPr id="156" name="Google Shape;156;g23168ecdf95_0_150:notes"/>
+          <p:cNvSpPr/>
+          <p:nvPr>
+            <p:ph idx="2" type="sldImg"/>
+          </p:nvPr>
+        </p:nvSpPr>
+        <p:spPr>
+          <a:xfrm>
+            <a:off x="381300" y="685800"/>
+            <a:ext cx="6096000" cy="3429000"/>
+          </a:xfrm>
+          <a:custGeom>
+            <a:rect b="b" l="l" r="r" t="t"/>
+            <a:pathLst>
+              <a:path extrusionOk="0" h="120000" w="120000">
+                <a:moveTo>
+                  <a:pt x="0" y="0"/>
+                </a:moveTo>
+                <a:lnTo>
+                  <a:pt x="120000" y="0"/>
+                </a:lnTo>
+                <a:lnTo>
+                  <a:pt x="120000" y="120000"/>
+                </a:lnTo>
+                <a:lnTo>
+                  <a:pt x="0" y="120000"/>
+                </a:lnTo>
+                <a:close/>
+              </a:path>
+            </a:pathLst>
+          </a:custGeom>
+        </p:spPr>
+      </p:sp>
+      <p:sp>
+        <p:nvSpPr>
+          <p:cNvPr id="157" name="Google Shape;157;g23168ecdf95_0_150:notes"/>
+          <p:cNvSpPr txBox="1"/>
+          <p:nvPr>
+            <p:ph idx="1" type="body"/>
+          </p:nvPr>
+        </p:nvSpPr>
+        <p:spPr>
+          <a:xfrm>
+            <a:off x="685800" y="4343400"/>
+            <a:ext cx="5486400" cy="4114800"/>
+          </a:xfrm>
+          <a:prstGeom prst="rect">
+            <a:avLst/>
+          </a:prstGeom>
+        </p:spPr>
+        <p:txBody>
+          <a:bodyPr anchorCtr="0" anchor="t" bIns="91425" lIns="91425" spcFirstLastPara="1" rIns="91425" wrap="square" tIns="91425">
+            <a:noAutofit/>
+          </a:bodyPr>
+          <a:lstStyle/>
+          <a:p>
+            <a:pPr indent="0" lvl="0" marL="0" rtl="0" algn="l">
+              <a:spcBef>
+                <a:spcPts val="0"/>
+              </a:spcBef>
+              <a:spcAft>
+                <a:spcPts val="0"/>
+              </a:spcAft>
+              <a:buNone/>
+            </a:pPr>
+            <a:r>
+              <a:t/>
+            </a:r>
+            <a:endParaRPr/>
+          </a:p>
+        </p:txBody>
+      </p:sp>
+    </p:spTree>
+  </p:cSld>
+  <p:clrMapOvr>
+    <a:masterClrMapping/>
+  </p:clrMapOvr>
+</p:notes>
+</file>
+
+<file path=ppt/notesSlides/notesSlide7.xml><?xml version="1.0" encoding="utf-8"?>
+<p:notes xmlns:a="http://schemas.openxmlformats.org/drawingml/2006/main" xmlns:r="http://schemas.openxmlformats.org/officeDocument/2006/relationships" xmlns:mc="http://schemas.openxmlformats.org/markup-compatibility/2006" xmlns:mv="urn:schemas-microsoft-com:mac:vml" xmlns:p="http://schemas.openxmlformats.org/presentationml/2006/main" xmlns:c="http://schemas.openxmlformats.org/drawingml/2006/chart" xmlns:dgm="http://schemas.openxmlformats.org/drawingml/2006/diagram" xmlns:o="urn:schemas-microsoft-com:office:office" xmlns:v="urn:schemas-microsoft-com:vml" xmlns:pvml="urn:schemas-microsoft-com:office:powerpoint" xmlns:com="http://schemas.openxmlformats.org/drawingml/2006/compatibility" xmlns:p14="http://schemas.microsoft.com/office/powerpoint/2010/main" xmlns:p15="http://schemas.microsoft.com/office/powerpoint/2012/main" xmlns:ahyp="http://schemas.microsoft.com/office/drawing/2018/hyperlinkcolor" showMasterPhAnim="0" showMasterSp="0">
+  <p:cSld>
+    <p:spTree>
+      <p:nvGrpSpPr>
+        <p:cNvPr id="162" name="Shape 162"/>
+        <p:cNvGrpSpPr/>
+        <p:nvPr/>
+      </p:nvGrpSpPr>
+      <p:grpSpPr>
+        <a:xfrm>
+          <a:off x="0" y="0"/>
+          <a:ext cx="0" cy="0"/>
+          <a:chOff x="0" y="0"/>
+          <a:chExt cx="0" cy="0"/>
+        </a:xfrm>
+      </p:grpSpPr>
+      <p:sp>
+        <p:nvSpPr>
+          <p:cNvPr id="163" name="Google Shape;163;g23168ecdf95_0_158:notes"/>
+          <p:cNvSpPr/>
+          <p:nvPr>
+            <p:ph idx="2" type="sldImg"/>
+          </p:nvPr>
+        </p:nvSpPr>
+        <p:spPr>
+          <a:xfrm>
+            <a:off x="381300" y="685800"/>
+            <a:ext cx="6096000" cy="3429000"/>
+          </a:xfrm>
+          <a:custGeom>
+            <a:rect b="b" l="l" r="r" t="t"/>
+            <a:pathLst>
+              <a:path extrusionOk="0" h="120000" w="120000">
+                <a:moveTo>
+                  <a:pt x="0" y="0"/>
+                </a:moveTo>
+                <a:lnTo>
+                  <a:pt x="120000" y="0"/>
+                </a:lnTo>
+                <a:lnTo>
+                  <a:pt x="120000" y="120000"/>
+                </a:lnTo>
+                <a:lnTo>
+                  <a:pt x="0" y="120000"/>
+                </a:lnTo>
+                <a:close/>
+              </a:path>
+            </a:pathLst>
+          </a:custGeom>
+        </p:spPr>
+      </p:sp>
+      <p:sp>
+        <p:nvSpPr>
+          <p:cNvPr id="164" name="Google Shape;164;g23168ecdf95_0_158:notes"/>
+          <p:cNvSpPr txBox="1"/>
+          <p:nvPr>
+            <p:ph idx="1" type="body"/>
+          </p:nvPr>
+        </p:nvSpPr>
+        <p:spPr>
+          <a:xfrm>
+            <a:off x="685800" y="4343400"/>
+            <a:ext cx="5486400" cy="4114800"/>
+          </a:xfrm>
+          <a:prstGeom prst="rect">
+            <a:avLst/>
+          </a:prstGeom>
+        </p:spPr>
+        <p:txBody>
+          <a:bodyPr anchorCtr="0" anchor="t" bIns="91425" lIns="91425" spcFirstLastPara="1" rIns="91425" wrap="square" tIns="91425">
+            <a:noAutofit/>
+          </a:bodyPr>
+          <a:lstStyle/>
+          <a:p>
+            <a:pPr indent="0" lvl="0" marL="0" rtl="0" algn="l">
+              <a:spcBef>
+                <a:spcPts val="0"/>
+              </a:spcBef>
+              <a:spcAft>
+                <a:spcPts val="0"/>
+              </a:spcAft>
+              <a:buNone/>
+            </a:pPr>
+            <a:r>
+              <a:t/>
+            </a:r>
+            <a:endParaRPr/>
+          </a:p>
+        </p:txBody>
+      </p:sp>
+    </p:spTree>
+  </p:cSld>
+  <p:clrMapOvr>
+    <a:masterClrMapping/>
+  </p:clrMapOvr>
+</p:notes>
+</file>
+
+<file path=ppt/notesSlides/notesSlide8.xml><?xml version="1.0" encoding="utf-8"?>
+<p:notes xmlns:a="http://schemas.openxmlformats.org/drawingml/2006/main" xmlns:r="http://schemas.openxmlformats.org/officeDocument/2006/relationships" xmlns:mc="http://schemas.openxmlformats.org/markup-compatibility/2006" xmlns:mv="urn:schemas-microsoft-com:mac:vml" xmlns:p="http://schemas.openxmlformats.org/presentationml/2006/main" xmlns:c="http://schemas.openxmlformats.org/drawingml/2006/chart" xmlns:dgm="http://schemas.openxmlformats.org/drawingml/2006/diagram" xmlns:o="urn:schemas-microsoft-com:office:office" xmlns:v="urn:schemas-microsoft-com:vml" xmlns:pvml="urn:schemas-microsoft-com:office:powerpoint" xmlns:com="http://schemas.openxmlformats.org/drawingml/2006/compatibility" xmlns:p14="http://schemas.microsoft.com/office/powerpoint/2010/main" xmlns:p15="http://schemas.microsoft.com/office/powerpoint/2012/main" xmlns:ahyp="http://schemas.microsoft.com/office/drawing/2018/hyperlinkcolor" showMasterPhAnim="0" showMasterSp="0">
+  <p:cSld>
+    <p:spTree>
+      <p:nvGrpSpPr>
+        <p:cNvPr id="168" name="Shape 168"/>
+        <p:cNvGrpSpPr/>
+        <p:nvPr/>
+      </p:nvGrpSpPr>
+      <p:grpSpPr>
+        <a:xfrm>
+          <a:off x="0" y="0"/>
+          <a:ext cx="0" cy="0"/>
+          <a:chOff x="0" y="0"/>
+          <a:chExt cx="0" cy="0"/>
+        </a:xfrm>
+      </p:grpSpPr>
+      <p:sp>
+        <p:nvSpPr>
+          <p:cNvPr id="169" name="Google Shape;169;g23168ecdf95_0_166:notes"/>
+          <p:cNvSpPr/>
+          <p:nvPr>
+            <p:ph idx="2" type="sldImg"/>
+          </p:nvPr>
+        </p:nvSpPr>
+        <p:spPr>
+          <a:xfrm>
+            <a:off x="381300" y="685800"/>
+            <a:ext cx="6096000" cy="3429000"/>
+          </a:xfrm>
+          <a:custGeom>
+            <a:rect b="b" l="l" r="r" t="t"/>
+            <a:pathLst>
+              <a:path extrusionOk="0" h="120000" w="120000">
+                <a:moveTo>
+                  <a:pt x="0" y="0"/>
+                </a:moveTo>
+                <a:lnTo>
+                  <a:pt x="120000" y="0"/>
+                </a:lnTo>
+                <a:lnTo>
+                  <a:pt x="120000" y="120000"/>
+                </a:lnTo>
+                <a:lnTo>
+                  <a:pt x="0" y="120000"/>
+                </a:lnTo>
+                <a:close/>
+              </a:path>
+            </a:pathLst>
+          </a:custGeom>
+        </p:spPr>
+      </p:sp>
+      <p:sp>
+        <p:nvSpPr>
+          <p:cNvPr id="170" name="Google Shape;170;g23168ecdf95_0_166:notes"/>
           <p:cNvSpPr txBox="1"/>
           <p:nvPr>
             <p:ph idx="1" type="body"/>
@@ -9361,6 +9961,628 @@
 </p:sld>
 </file>
 
+<file path=ppt/slides/slide3.xml><?xml version="1.0" encoding="utf-8"?>
+<p:sld xmlns:a="http://schemas.openxmlformats.org/drawingml/2006/main" xmlns:r="http://schemas.openxmlformats.org/officeDocument/2006/relationships" xmlns:mc="http://schemas.openxmlformats.org/markup-compatibility/2006" xmlns:mv="urn:schemas-microsoft-com:mac:vml" xmlns:p="http://schemas.openxmlformats.org/presentationml/2006/main" xmlns:c="http://schemas.openxmlformats.org/drawingml/2006/chart" xmlns:dgm="http://schemas.openxmlformats.org/drawingml/2006/diagram" xmlns:o="urn:schemas-microsoft-com:office:office" xmlns:v="urn:schemas-microsoft-com:vml" xmlns:pvml="urn:schemas-microsoft-com:office:powerpoint" xmlns:com="http://schemas.openxmlformats.org/drawingml/2006/compatibility" xmlns:p14="http://schemas.microsoft.com/office/powerpoint/2010/main" xmlns:p15="http://schemas.microsoft.com/office/powerpoint/2012/main" xmlns:ahyp="http://schemas.microsoft.com/office/drawing/2018/hyperlinkcolor">
+  <p:cSld>
+    <p:spTree>
+      <p:nvGrpSpPr>
+        <p:cNvPr id="139" name="Shape 139"/>
+        <p:cNvGrpSpPr/>
+        <p:nvPr/>
+      </p:nvGrpSpPr>
+      <p:grpSpPr>
+        <a:xfrm>
+          <a:off x="0" y="0"/>
+          <a:ext cx="0" cy="0"/>
+          <a:chOff x="0" y="0"/>
+          <a:chExt cx="0" cy="0"/>
+        </a:xfrm>
+      </p:grpSpPr>
+      <p:sp>
+        <p:nvSpPr>
+          <p:cNvPr id="140" name="Google Shape;140;p15"/>
+          <p:cNvSpPr txBox="1"/>
+          <p:nvPr>
+            <p:ph type="title"/>
+          </p:nvPr>
+        </p:nvSpPr>
+        <p:spPr>
+          <a:xfrm>
+            <a:off x="819150" y="589900"/>
+            <a:ext cx="7505700" cy="954600"/>
+          </a:xfrm>
+          <a:prstGeom prst="rect">
+            <a:avLst/>
+          </a:prstGeom>
+        </p:spPr>
+        <p:txBody>
+          <a:bodyPr anchorCtr="0" anchor="t" bIns="91425" lIns="91425" spcFirstLastPara="1" rIns="91425" wrap="square" tIns="91425">
+            <a:normAutofit/>
+          </a:bodyPr>
+          <a:lstStyle/>
+          <a:p>
+            <a:pPr indent="0" lvl="0" marL="0" rtl="0" algn="l">
+              <a:spcBef>
+                <a:spcPts val="0"/>
+              </a:spcBef>
+              <a:spcAft>
+                <a:spcPts val="0"/>
+              </a:spcAft>
+              <a:buNone/>
+            </a:pPr>
+            <a:r>
+              <a:rPr lang="en-GB"/>
+              <a:t>Hasil Model Deep Learning</a:t>
+            </a:r>
+            <a:endParaRPr/>
+          </a:p>
+        </p:txBody>
+      </p:sp>
+      <p:pic>
+        <p:nvPicPr>
+          <p:cNvPr id="141" name="Google Shape;141;p15"/>
+          <p:cNvPicPr preferRelativeResize="0"/>
+          <p:nvPr/>
+        </p:nvPicPr>
+        <p:blipFill>
+          <a:blip r:embed="rId3">
+            <a:alphaModFix/>
+          </a:blip>
+          <a:stretch>
+            <a:fillRect/>
+          </a:stretch>
+        </p:blipFill>
+        <p:spPr>
+          <a:xfrm>
+            <a:off x="819150" y="1784550"/>
+            <a:ext cx="3593750" cy="1849100"/>
+          </a:xfrm>
+          <a:prstGeom prst="rect">
+            <a:avLst/>
+          </a:prstGeom>
+          <a:noFill/>
+          <a:ln>
+            <a:noFill/>
+          </a:ln>
+        </p:spPr>
+      </p:pic>
+      <p:pic>
+        <p:nvPicPr>
+          <p:cNvPr id="142" name="Google Shape;142;p15"/>
+          <p:cNvPicPr preferRelativeResize="0"/>
+          <p:nvPr/>
+        </p:nvPicPr>
+        <p:blipFill>
+          <a:blip r:embed="rId4">
+            <a:alphaModFix/>
+          </a:blip>
+          <a:stretch>
+            <a:fillRect/>
+          </a:stretch>
+        </p:blipFill>
+        <p:spPr>
+          <a:xfrm>
+            <a:off x="4989050" y="1784550"/>
+            <a:ext cx="3231446" cy="1849100"/>
+          </a:xfrm>
+          <a:prstGeom prst="rect">
+            <a:avLst/>
+          </a:prstGeom>
+          <a:noFill/>
+          <a:ln>
+            <a:noFill/>
+          </a:ln>
+        </p:spPr>
+      </p:pic>
+    </p:spTree>
+  </p:cSld>
+  <p:clrMapOvr>
+    <a:masterClrMapping/>
+  </p:clrMapOvr>
+</p:sld>
+</file>
+
+<file path=ppt/slides/slide4.xml><?xml version="1.0" encoding="utf-8"?>
+<p:sld xmlns:a="http://schemas.openxmlformats.org/drawingml/2006/main" xmlns:r="http://schemas.openxmlformats.org/officeDocument/2006/relationships" xmlns:mc="http://schemas.openxmlformats.org/markup-compatibility/2006" xmlns:mv="urn:schemas-microsoft-com:mac:vml" xmlns:p="http://schemas.openxmlformats.org/presentationml/2006/main" xmlns:c="http://schemas.openxmlformats.org/drawingml/2006/chart" xmlns:dgm="http://schemas.openxmlformats.org/drawingml/2006/diagram" xmlns:o="urn:schemas-microsoft-com:office:office" xmlns:v="urn:schemas-microsoft-com:vml" xmlns:pvml="urn:schemas-microsoft-com:office:powerpoint" xmlns:com="http://schemas.openxmlformats.org/drawingml/2006/compatibility" xmlns:p14="http://schemas.microsoft.com/office/powerpoint/2010/main" xmlns:p15="http://schemas.microsoft.com/office/powerpoint/2012/main" xmlns:ahyp="http://schemas.microsoft.com/office/drawing/2018/hyperlinkcolor">
+  <p:cSld>
+    <p:spTree>
+      <p:nvGrpSpPr>
+        <p:cNvPr id="146" name="Shape 146"/>
+        <p:cNvGrpSpPr/>
+        <p:nvPr/>
+      </p:nvGrpSpPr>
+      <p:grpSpPr>
+        <a:xfrm>
+          <a:off x="0" y="0"/>
+          <a:ext cx="0" cy="0"/>
+          <a:chOff x="0" y="0"/>
+          <a:chExt cx="0" cy="0"/>
+        </a:xfrm>
+      </p:grpSpPr>
+      <p:pic>
+        <p:nvPicPr>
+          <p:cNvPr id="147" name="Google Shape;147;p16"/>
+          <p:cNvPicPr preferRelativeResize="0"/>
+          <p:nvPr/>
+        </p:nvPicPr>
+        <p:blipFill>
+          <a:blip r:embed="rId3">
+            <a:alphaModFix/>
+          </a:blip>
+          <a:stretch>
+            <a:fillRect/>
+          </a:stretch>
+        </p:blipFill>
+        <p:spPr>
+          <a:xfrm>
+            <a:off x="941450" y="1572038"/>
+            <a:ext cx="3582025" cy="2146125"/>
+          </a:xfrm>
+          <a:prstGeom prst="rect">
+            <a:avLst/>
+          </a:prstGeom>
+          <a:noFill/>
+          <a:ln>
+            <a:noFill/>
+          </a:ln>
+        </p:spPr>
+      </p:pic>
+      <p:pic>
+        <p:nvPicPr>
+          <p:cNvPr id="148" name="Google Shape;148;p16"/>
+          <p:cNvPicPr preferRelativeResize="0"/>
+          <p:nvPr/>
+        </p:nvPicPr>
+        <p:blipFill>
+          <a:blip r:embed="rId4">
+            <a:alphaModFix/>
+          </a:blip>
+          <a:stretch>
+            <a:fillRect/>
+          </a:stretch>
+        </p:blipFill>
+        <p:spPr>
+          <a:xfrm>
+            <a:off x="4875525" y="1375425"/>
+            <a:ext cx="3449335" cy="2539350"/>
+          </a:xfrm>
+          <a:prstGeom prst="rect">
+            <a:avLst/>
+          </a:prstGeom>
+          <a:noFill/>
+          <a:ln>
+            <a:noFill/>
+          </a:ln>
+        </p:spPr>
+      </p:pic>
+    </p:spTree>
+  </p:cSld>
+  <p:clrMapOvr>
+    <a:masterClrMapping/>
+  </p:clrMapOvr>
+</p:sld>
+</file>
+
+<file path=ppt/slides/slide5.xml><?xml version="1.0" encoding="utf-8"?>
+<p:sld xmlns:a="http://schemas.openxmlformats.org/drawingml/2006/main" xmlns:r="http://schemas.openxmlformats.org/officeDocument/2006/relationships" xmlns:mc="http://schemas.openxmlformats.org/markup-compatibility/2006" xmlns:mv="urn:schemas-microsoft-com:mac:vml" xmlns:p="http://schemas.openxmlformats.org/presentationml/2006/main" xmlns:c="http://schemas.openxmlformats.org/drawingml/2006/chart" xmlns:dgm="http://schemas.openxmlformats.org/drawingml/2006/diagram" xmlns:o="urn:schemas-microsoft-com:office:office" xmlns:v="urn:schemas-microsoft-com:vml" xmlns:pvml="urn:schemas-microsoft-com:office:powerpoint" xmlns:com="http://schemas.openxmlformats.org/drawingml/2006/compatibility" xmlns:p14="http://schemas.microsoft.com/office/powerpoint/2010/main" xmlns:p15="http://schemas.microsoft.com/office/powerpoint/2012/main" xmlns:ahyp="http://schemas.microsoft.com/office/drawing/2018/hyperlinkcolor">
+  <p:cSld>
+    <p:spTree>
+      <p:nvGrpSpPr>
+        <p:cNvPr id="152" name="Shape 152"/>
+        <p:cNvGrpSpPr/>
+        <p:nvPr/>
+      </p:nvGrpSpPr>
+      <p:grpSpPr>
+        <a:xfrm>
+          <a:off x="0" y="0"/>
+          <a:ext cx="0" cy="0"/>
+          <a:chOff x="0" y="0"/>
+          <a:chExt cx="0" cy="0"/>
+        </a:xfrm>
+      </p:grpSpPr>
+      <p:pic>
+        <p:nvPicPr>
+          <p:cNvPr id="153" name="Google Shape;153;p17"/>
+          <p:cNvPicPr preferRelativeResize="0"/>
+          <p:nvPr/>
+        </p:nvPicPr>
+        <p:blipFill>
+          <a:blip r:embed="rId3">
+            <a:alphaModFix/>
+          </a:blip>
+          <a:stretch>
+            <a:fillRect/>
+          </a:stretch>
+        </p:blipFill>
+        <p:spPr>
+          <a:xfrm>
+            <a:off x="898644" y="1185475"/>
+            <a:ext cx="4511049" cy="3294201"/>
+          </a:xfrm>
+          <a:prstGeom prst="rect">
+            <a:avLst/>
+          </a:prstGeom>
+          <a:noFill/>
+          <a:ln>
+            <a:noFill/>
+          </a:ln>
+        </p:spPr>
+      </p:pic>
+      <p:pic>
+        <p:nvPicPr>
+          <p:cNvPr id="154" name="Google Shape;154;p17"/>
+          <p:cNvPicPr preferRelativeResize="0"/>
+          <p:nvPr/>
+        </p:nvPicPr>
+        <p:blipFill>
+          <a:blip r:embed="rId4">
+            <a:alphaModFix/>
+          </a:blip>
+          <a:stretch>
+            <a:fillRect/>
+          </a:stretch>
+        </p:blipFill>
+        <p:spPr>
+          <a:xfrm>
+            <a:off x="4949225" y="2141047"/>
+            <a:ext cx="3674401" cy="1383050"/>
+          </a:xfrm>
+          <a:prstGeom prst="rect">
+            <a:avLst/>
+          </a:prstGeom>
+          <a:noFill/>
+          <a:ln>
+            <a:noFill/>
+          </a:ln>
+        </p:spPr>
+      </p:pic>
+    </p:spTree>
+  </p:cSld>
+  <p:clrMapOvr>
+    <a:masterClrMapping/>
+  </p:clrMapOvr>
+</p:sld>
+</file>
+
+<file path=ppt/slides/slide6.xml><?xml version="1.0" encoding="utf-8"?>
+<p:sld xmlns:a="http://schemas.openxmlformats.org/drawingml/2006/main" xmlns:r="http://schemas.openxmlformats.org/officeDocument/2006/relationships" xmlns:mc="http://schemas.openxmlformats.org/markup-compatibility/2006" xmlns:mv="urn:schemas-microsoft-com:mac:vml" xmlns:p="http://schemas.openxmlformats.org/presentationml/2006/main" xmlns:c="http://schemas.openxmlformats.org/drawingml/2006/chart" xmlns:dgm="http://schemas.openxmlformats.org/drawingml/2006/diagram" xmlns:o="urn:schemas-microsoft-com:office:office" xmlns:v="urn:schemas-microsoft-com:vml" xmlns:pvml="urn:schemas-microsoft-com:office:powerpoint" xmlns:com="http://schemas.openxmlformats.org/drawingml/2006/compatibility" xmlns:p14="http://schemas.microsoft.com/office/powerpoint/2010/main" xmlns:p15="http://schemas.microsoft.com/office/powerpoint/2012/main" xmlns:ahyp="http://schemas.microsoft.com/office/drawing/2018/hyperlinkcolor">
+  <p:cSld>
+    <p:spTree>
+      <p:nvGrpSpPr>
+        <p:cNvPr id="158" name="Shape 158"/>
+        <p:cNvGrpSpPr/>
+        <p:nvPr/>
+      </p:nvGrpSpPr>
+      <p:grpSpPr>
+        <a:xfrm>
+          <a:off x="0" y="0"/>
+          <a:ext cx="0" cy="0"/>
+          <a:chOff x="0" y="0"/>
+          <a:chExt cx="0" cy="0"/>
+        </a:xfrm>
+      </p:grpSpPr>
+      <p:sp>
+        <p:nvSpPr>
+          <p:cNvPr id="159" name="Google Shape;159;p18"/>
+          <p:cNvSpPr txBox="1"/>
+          <p:nvPr>
+            <p:ph type="title"/>
+          </p:nvPr>
+        </p:nvSpPr>
+        <p:spPr>
+          <a:xfrm>
+            <a:off x="819150" y="589900"/>
+            <a:ext cx="7505700" cy="954600"/>
+          </a:xfrm>
+          <a:prstGeom prst="rect">
+            <a:avLst/>
+          </a:prstGeom>
+        </p:spPr>
+        <p:txBody>
+          <a:bodyPr anchorCtr="0" anchor="t" bIns="91425" lIns="91425" spcFirstLastPara="1" rIns="91425" wrap="square" tIns="91425">
+            <a:normAutofit/>
+          </a:bodyPr>
+          <a:lstStyle/>
+          <a:p>
+            <a:pPr indent="0" lvl="0" marL="0" rtl="0" algn="l">
+              <a:spcBef>
+                <a:spcPts val="0"/>
+              </a:spcBef>
+              <a:spcAft>
+                <a:spcPts val="0"/>
+              </a:spcAft>
+              <a:buNone/>
+            </a:pPr>
+            <a:r>
+              <a:rPr lang="en-GB"/>
+              <a:t>Hasil MPL Classifier</a:t>
+            </a:r>
+            <a:endParaRPr/>
+          </a:p>
+        </p:txBody>
+      </p:sp>
+      <p:pic>
+        <p:nvPicPr>
+          <p:cNvPr id="160" name="Google Shape;160;p18"/>
+          <p:cNvPicPr preferRelativeResize="0"/>
+          <p:nvPr/>
+        </p:nvPicPr>
+        <p:blipFill>
+          <a:blip r:embed="rId3">
+            <a:alphaModFix/>
+          </a:blip>
+          <a:stretch>
+            <a:fillRect/>
+          </a:stretch>
+        </p:blipFill>
+        <p:spPr>
+          <a:xfrm>
+            <a:off x="819150" y="1455775"/>
+            <a:ext cx="3143250" cy="2428875"/>
+          </a:xfrm>
+          <a:prstGeom prst="rect">
+            <a:avLst/>
+          </a:prstGeom>
+          <a:noFill/>
+          <a:ln>
+            <a:noFill/>
+          </a:ln>
+        </p:spPr>
+      </p:pic>
+      <p:pic>
+        <p:nvPicPr>
+          <p:cNvPr id="161" name="Google Shape;161;p18"/>
+          <p:cNvPicPr preferRelativeResize="0"/>
+          <p:nvPr/>
+        </p:nvPicPr>
+        <p:blipFill>
+          <a:blip r:embed="rId4">
+            <a:alphaModFix/>
+          </a:blip>
+          <a:stretch>
+            <a:fillRect/>
+          </a:stretch>
+        </p:blipFill>
+        <p:spPr>
+          <a:xfrm>
+            <a:off x="4644025" y="1499488"/>
+            <a:ext cx="3680825" cy="2144525"/>
+          </a:xfrm>
+          <a:prstGeom prst="rect">
+            <a:avLst/>
+          </a:prstGeom>
+          <a:noFill/>
+          <a:ln>
+            <a:noFill/>
+          </a:ln>
+        </p:spPr>
+      </p:pic>
+    </p:spTree>
+  </p:cSld>
+  <p:clrMapOvr>
+    <a:masterClrMapping/>
+  </p:clrMapOvr>
+</p:sld>
+</file>
+
+<file path=ppt/slides/slide7.xml><?xml version="1.0" encoding="utf-8"?>
+<p:sld xmlns:a="http://schemas.openxmlformats.org/drawingml/2006/main" xmlns:r="http://schemas.openxmlformats.org/officeDocument/2006/relationships" xmlns:mc="http://schemas.openxmlformats.org/markup-compatibility/2006" xmlns:mv="urn:schemas-microsoft-com:mac:vml" xmlns:p="http://schemas.openxmlformats.org/presentationml/2006/main" xmlns:c="http://schemas.openxmlformats.org/drawingml/2006/chart" xmlns:dgm="http://schemas.openxmlformats.org/drawingml/2006/diagram" xmlns:o="urn:schemas-microsoft-com:office:office" xmlns:v="urn:schemas-microsoft-com:vml" xmlns:pvml="urn:schemas-microsoft-com:office:powerpoint" xmlns:com="http://schemas.openxmlformats.org/drawingml/2006/compatibility" xmlns:p14="http://schemas.microsoft.com/office/powerpoint/2010/main" xmlns:p15="http://schemas.microsoft.com/office/powerpoint/2012/main" xmlns:ahyp="http://schemas.microsoft.com/office/drawing/2018/hyperlinkcolor">
+  <p:cSld>
+    <p:spTree>
+      <p:nvGrpSpPr>
+        <p:cNvPr id="165" name="Shape 165"/>
+        <p:cNvGrpSpPr/>
+        <p:nvPr/>
+      </p:nvGrpSpPr>
+      <p:grpSpPr>
+        <a:xfrm>
+          <a:off x="0" y="0"/>
+          <a:ext cx="0" cy="0"/>
+          <a:chOff x="0" y="0"/>
+          <a:chExt cx="0" cy="0"/>
+        </a:xfrm>
+      </p:grpSpPr>
+      <p:pic>
+        <p:nvPicPr>
+          <p:cNvPr id="166" name="Google Shape;166;p19"/>
+          <p:cNvPicPr preferRelativeResize="0"/>
+          <p:nvPr/>
+        </p:nvPicPr>
+        <p:blipFill>
+          <a:blip r:embed="rId3">
+            <a:alphaModFix/>
+          </a:blip>
+          <a:stretch>
+            <a:fillRect/>
+          </a:stretch>
+        </p:blipFill>
+        <p:spPr>
+          <a:xfrm>
+            <a:off x="812914" y="831938"/>
+            <a:ext cx="5753926" cy="3163875"/>
+          </a:xfrm>
+          <a:prstGeom prst="rect">
+            <a:avLst/>
+          </a:prstGeom>
+          <a:noFill/>
+          <a:ln>
+            <a:noFill/>
+          </a:ln>
+        </p:spPr>
+      </p:pic>
+      <p:pic>
+        <p:nvPicPr>
+          <p:cNvPr id="167" name="Google Shape;167;p19"/>
+          <p:cNvPicPr preferRelativeResize="0"/>
+          <p:nvPr/>
+        </p:nvPicPr>
+        <p:blipFill>
+          <a:blip r:embed="rId4">
+            <a:alphaModFix/>
+          </a:blip>
+          <a:stretch>
+            <a:fillRect/>
+          </a:stretch>
+        </p:blipFill>
+        <p:spPr>
+          <a:xfrm>
+            <a:off x="4311538" y="3139987"/>
+            <a:ext cx="4019550" cy="1171575"/>
+          </a:xfrm>
+          <a:prstGeom prst="rect">
+            <a:avLst/>
+          </a:prstGeom>
+          <a:noFill/>
+          <a:ln>
+            <a:noFill/>
+          </a:ln>
+        </p:spPr>
+      </p:pic>
+    </p:spTree>
+  </p:cSld>
+  <p:clrMapOvr>
+    <a:masterClrMapping/>
+  </p:clrMapOvr>
+</p:sld>
+</file>
+
+<file path=ppt/slides/slide8.xml><?xml version="1.0" encoding="utf-8"?>
+<p:sld xmlns:a="http://schemas.openxmlformats.org/drawingml/2006/main" xmlns:r="http://schemas.openxmlformats.org/officeDocument/2006/relationships" xmlns:mc="http://schemas.openxmlformats.org/markup-compatibility/2006" xmlns:mv="urn:schemas-microsoft-com:mac:vml" xmlns:p="http://schemas.openxmlformats.org/presentationml/2006/main" xmlns:c="http://schemas.openxmlformats.org/drawingml/2006/chart" xmlns:dgm="http://schemas.openxmlformats.org/drawingml/2006/diagram" xmlns:o="urn:schemas-microsoft-com:office:office" xmlns:v="urn:schemas-microsoft-com:vml" xmlns:pvml="urn:schemas-microsoft-com:office:powerpoint" xmlns:com="http://schemas.openxmlformats.org/drawingml/2006/compatibility" xmlns:p14="http://schemas.microsoft.com/office/powerpoint/2010/main" xmlns:p15="http://schemas.microsoft.com/office/powerpoint/2012/main" xmlns:ahyp="http://schemas.microsoft.com/office/drawing/2018/hyperlinkcolor">
+  <p:cSld>
+    <p:spTree>
+      <p:nvGrpSpPr>
+        <p:cNvPr id="171" name="Shape 171"/>
+        <p:cNvGrpSpPr/>
+        <p:nvPr/>
+      </p:nvGrpSpPr>
+      <p:grpSpPr>
+        <a:xfrm>
+          <a:off x="0" y="0"/>
+          <a:ext cx="0" cy="0"/>
+          <a:chOff x="0" y="0"/>
+          <a:chExt cx="0" cy="0"/>
+        </a:xfrm>
+      </p:grpSpPr>
+      <p:pic>
+        <p:nvPicPr>
+          <p:cNvPr id="172" name="Google Shape;172;p20"/>
+          <p:cNvPicPr preferRelativeResize="0"/>
+          <p:nvPr/>
+        </p:nvPicPr>
+        <p:blipFill>
+          <a:blip r:embed="rId3">
+            <a:alphaModFix/>
+          </a:blip>
+          <a:stretch>
+            <a:fillRect/>
+          </a:stretch>
+        </p:blipFill>
+        <p:spPr>
+          <a:xfrm>
+            <a:off x="590750" y="1158888"/>
+            <a:ext cx="4667250" cy="647700"/>
+          </a:xfrm>
+          <a:prstGeom prst="rect">
+            <a:avLst/>
+          </a:prstGeom>
+          <a:noFill/>
+          <a:ln>
+            <a:noFill/>
+          </a:ln>
+        </p:spPr>
+      </p:pic>
+      <p:pic>
+        <p:nvPicPr>
+          <p:cNvPr id="173" name="Google Shape;173;p20"/>
+          <p:cNvPicPr preferRelativeResize="0"/>
+          <p:nvPr/>
+        </p:nvPicPr>
+        <p:blipFill>
+          <a:blip r:embed="rId4">
+            <a:alphaModFix/>
+          </a:blip>
+          <a:stretch>
+            <a:fillRect/>
+          </a:stretch>
+        </p:blipFill>
+        <p:spPr>
+          <a:xfrm>
+            <a:off x="590750" y="1907838"/>
+            <a:ext cx="3647950" cy="1911475"/>
+          </a:xfrm>
+          <a:prstGeom prst="rect">
+            <a:avLst/>
+          </a:prstGeom>
+          <a:noFill/>
+          <a:ln>
+            <a:noFill/>
+          </a:ln>
+        </p:spPr>
+      </p:pic>
+      <p:pic>
+        <p:nvPicPr>
+          <p:cNvPr id="174" name="Google Shape;174;p20"/>
+          <p:cNvPicPr preferRelativeResize="0"/>
+          <p:nvPr/>
+        </p:nvPicPr>
+        <p:blipFill>
+          <a:blip r:embed="rId5">
+            <a:alphaModFix/>
+          </a:blip>
+          <a:stretch>
+            <a:fillRect/>
+          </a:stretch>
+        </p:blipFill>
+        <p:spPr>
+          <a:xfrm>
+            <a:off x="4391100" y="1958988"/>
+            <a:ext cx="3718675" cy="2025625"/>
+          </a:xfrm>
+          <a:prstGeom prst="rect">
+            <a:avLst/>
+          </a:prstGeom>
+          <a:noFill/>
+          <a:ln>
+            <a:noFill/>
+          </a:ln>
+        </p:spPr>
+      </p:pic>
+      <p:pic>
+        <p:nvPicPr>
+          <p:cNvPr id="175" name="Google Shape;175;p20"/>
+          <p:cNvPicPr preferRelativeResize="0"/>
+          <p:nvPr/>
+        </p:nvPicPr>
+        <p:blipFill>
+          <a:blip r:embed="rId6">
+            <a:alphaModFix/>
+          </a:blip>
+          <a:stretch>
+            <a:fillRect/>
+          </a:stretch>
+        </p:blipFill>
+        <p:spPr>
+          <a:xfrm>
+            <a:off x="5712350" y="1235087"/>
+            <a:ext cx="1781175" cy="495300"/>
+          </a:xfrm>
+          <a:prstGeom prst="rect">
+            <a:avLst/>
+          </a:prstGeom>
+          <a:noFill/>
+          <a:ln>
+            <a:noFill/>
+          </a:ln>
+        </p:spPr>
+      </p:pic>
+    </p:spTree>
+  </p:cSld>
+  <p:clrMapOvr>
+    <a:masterClrMapping/>
+  </p:clrMapOvr>
+</p:sld>
+</file>
+
 <file path=ppt/theme/theme1.xml><?xml version="1.0" encoding="utf-8"?>
 <a:theme xmlns:a="http://schemas.openxmlformats.org/drawingml/2006/main" xmlns:r="http://schemas.openxmlformats.org/officeDocument/2006/relationships" name="Shift">
   <a:themeElements>

</xml_diff>